<commit_message>
Added & finished Powerpoint
</commit_message>
<xml_diff>
--- a/Emilie Paniagua MCMP.pptx
+++ b/Emilie Paniagua MCMP.pptx
@@ -255,7 +255,7 @@
           <a:p>
             <a:fld id="{7DC47EA8-7BD8-40A5-8F18-27F9B4D31F4A}" type="datetimeFigureOut">
               <a:rPr lang="fr-FR" smtClean="0"/>
-              <a:t>30/08/2021</a:t>
+              <a:t>31/08/2021</a:t>
             </a:fld>
             <a:endParaRPr lang="fr-FR"/>
           </a:p>
@@ -1010,7 +1010,7 @@
           <a:p>
             <a:fld id="{45758538-1108-40C6-BB08-C8810D84275A}" type="datetime1">
               <a:rPr lang="en-US" smtClean="0"/>
-              <a:t>8/30/2021</a:t>
+              <a:t>8/31/2021</a:t>
             </a:fld>
             <a:endParaRPr lang="en-US" dirty="0"/>
           </a:p>
@@ -1189,7 +1189,7 @@
           <a:p>
             <a:fld id="{151D0D79-A902-4A06-B402-19C71438B015}" type="datetime1">
               <a:rPr lang="en-US" smtClean="0"/>
-              <a:t>8/30/2021</a:t>
+              <a:t>8/31/2021</a:t>
             </a:fld>
             <a:endParaRPr lang="en-US" dirty="0"/>
           </a:p>
@@ -1368,7 +1368,7 @@
           <a:p>
             <a:fld id="{D3A16DB9-C23C-4059-B8D4-FF5DD3E660D1}" type="datetime1">
               <a:rPr lang="en-US" smtClean="0"/>
-              <a:t>8/30/2021</a:t>
+              <a:t>8/31/2021</a:t>
             </a:fld>
             <a:endParaRPr lang="en-US" dirty="0"/>
           </a:p>
@@ -1537,7 +1537,7 @@
           <a:p>
             <a:fld id="{D1D99CCF-F14C-4A8D-A934-9B4C29779AD8}" type="datetime1">
               <a:rPr lang="en-US" smtClean="0"/>
-              <a:t>8/30/2021</a:t>
+              <a:t>8/31/2021</a:t>
             </a:fld>
             <a:endParaRPr lang="en-US" dirty="0"/>
           </a:p>
@@ -1849,7 +1849,7 @@
           <a:p>
             <a:fld id="{AF50D916-32B1-4A09-9E73-3D4F38E1686F}" type="datetime1">
               <a:rPr lang="en-US" smtClean="0"/>
-              <a:t>8/30/2021</a:t>
+              <a:t>8/31/2021</a:t>
             </a:fld>
             <a:endParaRPr lang="en-US" dirty="0"/>
           </a:p>
@@ -2235,7 +2235,7 @@
           <a:p>
             <a:fld id="{D86AF4A9-4340-447C-831C-EE9EF572CBA9}" type="datetime1">
               <a:rPr lang="en-US" smtClean="0"/>
-              <a:t>8/30/2021</a:t>
+              <a:t>8/31/2021</a:t>
             </a:fld>
             <a:endParaRPr lang="en-US" dirty="0"/>
           </a:p>
@@ -2668,7 +2668,7 @@
           <a:p>
             <a:fld id="{35E68C1C-D3EA-4E03-9749-C72D3569CF1A}" type="datetime1">
               <a:rPr lang="en-US" smtClean="0"/>
-              <a:t>8/30/2021</a:t>
+              <a:t>8/31/2021</a:t>
             </a:fld>
             <a:endParaRPr lang="en-US" dirty="0"/>
           </a:p>
@@ -2785,7 +2785,7 @@
           <a:p>
             <a:fld id="{4403D399-E3C8-43FD-8207-B638D8F23C62}" type="datetime1">
               <a:rPr lang="en-US" smtClean="0"/>
-              <a:t>8/30/2021</a:t>
+              <a:t>8/31/2021</a:t>
             </a:fld>
             <a:endParaRPr lang="en-US" dirty="0"/>
           </a:p>
@@ -2879,7 +2879,7 @@
           <a:p>
             <a:fld id="{C81EC6DE-E539-42EC-9C55-5A0C2212A4B2}" type="datetime1">
               <a:rPr lang="en-US" smtClean="0"/>
-              <a:t>8/30/2021</a:t>
+              <a:t>8/31/2021</a:t>
             </a:fld>
             <a:endParaRPr lang="en-US" dirty="0"/>
           </a:p>
@@ -3228,7 +3228,7 @@
           <a:p>
             <a:fld id="{510017F9-AC9A-4CE7-B647-2BD5DF361AE5}" type="datetime1">
               <a:rPr lang="en-US" smtClean="0"/>
-              <a:t>8/30/2021</a:t>
+              <a:t>8/31/2021</a:t>
             </a:fld>
             <a:endParaRPr lang="en-US" dirty="0"/>
           </a:p>
@@ -3652,7 +3652,7 @@
           <a:p>
             <a:fld id="{3032E39C-6090-4A1E-B3ED-ADC8C0F2ED6D}" type="datetime1">
               <a:rPr lang="en-US" smtClean="0"/>
-              <a:t>8/30/2021</a:t>
+              <a:t>8/31/2021</a:t>
             </a:fld>
             <a:endParaRPr lang="en-US" dirty="0"/>
           </a:p>
@@ -3928,7 +3928,7 @@
           <a:p>
             <a:fld id="{52069564-D055-49C2-BFE5-2E6982CCED3B}" type="datetime1">
               <a:rPr lang="en-US" smtClean="0"/>
-              <a:t>8/30/2021</a:t>
+              <a:t>8/31/2021</a:t>
             </a:fld>
             <a:endParaRPr lang="en-US" dirty="0"/>
           </a:p>
@@ -4522,11 +4522,7 @@
           <a:p>
             <a:r>
               <a:rPr lang="fr-FR" dirty="0" smtClean="0"/>
-              <a:t>Moto club </a:t>
-            </a:r>
-            <a:r>
-              <a:rPr lang="fr-FR" dirty="0" smtClean="0"/>
-              <a:t>Millau Passion</a:t>
+              <a:t>Moto club Millau Passion</a:t>
             </a:r>
             <a:endParaRPr lang="fr-FR" dirty="0"/>
           </a:p>
@@ -4590,8 +4586,27 @@
             </a:r>
             <a:r>
               <a:rPr lang="fr-FR" dirty="0" smtClean="0"/>
-              <a:t>la persistance des données</a:t>
-            </a:r>
+              <a:t>la persistance des </a:t>
+            </a:r>
+            <a:r>
+              <a:rPr lang="fr-FR" dirty="0" smtClean="0"/>
+              <a:t>données</a:t>
+            </a:r>
+          </a:p>
+          <a:p>
+            <a:pPr>
+              <a:spcBef>
+                <a:spcPts val="0"/>
+              </a:spcBef>
+            </a:pPr>
+            <a:endParaRPr lang="fr-FR" dirty="0"/>
+          </a:p>
+          <a:p>
+            <a:pPr>
+              <a:spcBef>
+                <a:spcPts val="0"/>
+              </a:spcBef>
+            </a:pPr>
             <a:endParaRPr lang="fr-FR" dirty="0"/>
           </a:p>
         </p:txBody>
@@ -4654,6 +4669,44 @@
           </a:prstGeom>
         </p:spPr>
       </p:pic>
+      <p:sp>
+        <p:nvSpPr>
+          <p:cNvPr id="6" name="ZoneTexte 5"/>
+          <p:cNvSpPr txBox="1"/>
+          <p:nvPr/>
+        </p:nvSpPr>
+        <p:spPr>
+          <a:xfrm>
+            <a:off x="2622429" y="5822830"/>
+            <a:ext cx="3588589" cy="369332"/>
+          </a:xfrm>
+          <a:prstGeom prst="rect">
+            <a:avLst/>
+          </a:prstGeom>
+          <a:noFill/>
+        </p:spPr>
+        <p:txBody>
+          <a:bodyPr wrap="square" rtlCol="0">
+            <a:spAutoFit/>
+          </a:bodyPr>
+          <a:lstStyle/>
+          <a:p>
+            <a:r>
+              <a:rPr lang="fr-FR" dirty="0" smtClean="0"/>
+              <a:t>Jalon 1 : 1</a:t>
+            </a:r>
+            <a:r>
+              <a:rPr lang="fr-FR" baseline="30000" dirty="0" smtClean="0"/>
+              <a:t>er</a:t>
+            </a:r>
+            <a:r>
+              <a:rPr lang="fr-FR" dirty="0" smtClean="0"/>
+              <a:t> septembre 2021</a:t>
+            </a:r>
+            <a:endParaRPr lang="fr-FR" dirty="0"/>
+          </a:p>
+        </p:txBody>
+      </p:sp>
     </p:spTree>
     <p:extLst>
       <p:ext uri="{BB962C8B-B14F-4D97-AF65-F5344CB8AC3E}">
@@ -6257,6 +6310,13 @@
   <p:clrMapOvr>
     <a:masterClrMapping/>
   </p:clrMapOvr>
+  <p:timing>
+    <p:tnLst>
+      <p:par>
+        <p:cTn id="1" dur="indefinite" restart="never" nodeType="tmRoot"/>
+      </p:par>
+    </p:tnLst>
+  </p:timing>
 </p:sld>
 </file>
 
@@ -6310,14 +6370,14 @@
             <p:ph idx="1"/>
             <p:extLst>
               <p:ext uri="{D42A27DB-BD31-4B8C-83A1-F6EECF244321}">
-                <p14:modId xmlns:p14="http://schemas.microsoft.com/office/powerpoint/2010/main" val="312027951"/>
+                <p14:modId xmlns:p14="http://schemas.microsoft.com/office/powerpoint/2010/main" val="1693284024"/>
               </p:ext>
             </p:extLst>
           </p:nvPr>
         </p:nvGraphicFramePr>
         <p:xfrm>
-          <a:off x="1088136" y="2678207"/>
-          <a:ext cx="9632873" cy="701096"/>
+          <a:off x="1088136" y="2440452"/>
+          <a:ext cx="8875014" cy="701096"/>
         </p:xfrm>
         <a:graphic>
           <a:graphicData uri="http://schemas.openxmlformats.org/drawingml/2006/table">
@@ -6326,9 +6386,8 @@
                 <a:tableStyleId>{5C22544A-7EE6-4342-B048-85BDC9FD1C3A}</a:tableStyleId>
               </a:tblPr>
               <a:tblGrid>
-                <a:gridCol w="4763740"/>
-                <a:gridCol w="3477952"/>
-                <a:gridCol w="1391181"/>
+                <a:gridCol w="6869017"/>
+                <a:gridCol w="2005997"/>
               </a:tblGrid>
               <a:tr h="350548">
                 <a:tc>
@@ -6365,7 +6424,7 @@
                     <a:bodyPr/>
                     <a:lstStyle/>
                     <a:p>
-                      <a:pPr algn="just">
+                      <a:pPr algn="l">
                         <a:lnSpc>
                           <a:spcPct val="107000"/>
                         </a:lnSpc>
@@ -6374,41 +6433,18 @@
                         </a:spcAft>
                       </a:pPr>
                       <a:r>
-                        <a:rPr lang="fr-FR" sz="1800">
+                        <a:rPr lang="fr-FR" sz="1800" dirty="0">
                           <a:effectLst/>
                         </a:rPr>
                         <a:t> </a:t>
                       </a:r>
-                      <a:endParaRPr lang="fr-FR" sz="1800">
-                        <a:effectLst/>
-                        <a:latin typeface="Calibri" panose="020F0502020204030204" pitchFamily="34" charset="0"/>
-                        <a:ea typeface="SimSun" panose="02010600030101010101" pitchFamily="2" charset="-122"/>
-                        <a:cs typeface="Times New Roman" panose="02020603050405020304" pitchFamily="18" charset="0"/>
-                      </a:endParaRPr>
-                    </a:p>
-                  </a:txBody>
-                  <a:tcPr marL="44450" marR="44450" marT="0" marB="0" anchor="b"/>
-                </a:tc>
-                <a:tc>
-                  <a:txBody>
-                    <a:bodyPr/>
-                    <a:lstStyle/>
-                    <a:p>
-                      <a:pPr algn="just">
-                        <a:lnSpc>
-                          <a:spcPct val="107000"/>
-                        </a:lnSpc>
-                        <a:spcAft>
-                          <a:spcPts val="0"/>
-                        </a:spcAft>
-                      </a:pPr>
                       <a:r>
-                        <a:rPr lang="fr-FR" sz="1800">
+                        <a:rPr lang="fr-FR" sz="1800" dirty="0" smtClean="0">
                           <a:effectLst/>
                         </a:rPr>
-                        <a:t> </a:t>
+                        <a:t>type de donnée</a:t>
                       </a:r>
-                      <a:endParaRPr lang="fr-FR" sz="1800">
+                      <a:endParaRPr lang="fr-FR" sz="1800" dirty="0">
                         <a:effectLst/>
                         <a:latin typeface="Calibri" panose="020F0502020204030204" pitchFamily="34" charset="0"/>
                         <a:ea typeface="SimSun" panose="02010600030101010101" pitchFamily="2" charset="-122"/>
@@ -6435,11 +6471,17 @@
                       </a:pPr>
                       <a:r>
                         <a:rPr lang="fr-FR" sz="1800" dirty="0">
+                          <a:solidFill>
+                            <a:schemeClr val="tx1"/>
+                          </a:solidFill>
                           <a:effectLst/>
                         </a:rPr>
                         <a:t>nombre de participants à une activité</a:t>
                       </a:r>
                       <a:endParaRPr lang="fr-FR" sz="1800" dirty="0">
+                        <a:solidFill>
+                          <a:schemeClr val="tx1"/>
+                        </a:solidFill>
                         <a:effectLst/>
                         <a:latin typeface="Calibri" panose="020F0502020204030204" pitchFamily="34" charset="0"/>
                         <a:ea typeface="SimSun" panose="02010600030101010101" pitchFamily="2" charset="-122"/>
@@ -6447,7 +6489,14 @@
                       </a:endParaRPr>
                     </a:p>
                   </a:txBody>
-                  <a:tcPr marL="44450" marR="44450" marT="0" marB="0" anchor="b"/>
+                  <a:tcPr marL="44450" marR="44450" marT="0" marB="0" anchor="b">
+                    <a:solidFill>
+                      <a:schemeClr val="accent1">
+                        <a:lumMod val="20000"/>
+                        <a:lumOff val="80000"/>
+                      </a:schemeClr>
+                    </a:solidFill>
+                  </a:tcPr>
                 </a:tc>
                 <a:tc>
                   <a:txBody>
@@ -6463,39 +6512,16 @@
                         </a:spcAft>
                       </a:pPr>
                       <a:r>
-                        <a:rPr lang="fr-FR" sz="1800" dirty="0">
+                        <a:rPr lang="fr-FR" sz="1800" dirty="0" err="1" smtClean="0">
                           <a:effectLst/>
                         </a:rPr>
-                        <a:t> </a:t>
+                        <a:t>Number</a:t>
                       </a:r>
-                      <a:endParaRPr lang="fr-FR" sz="1800" dirty="0">
-                        <a:effectLst/>
-                        <a:latin typeface="Calibri" panose="020F0502020204030204" pitchFamily="34" charset="0"/>
-                        <a:ea typeface="SimSun" panose="02010600030101010101" pitchFamily="2" charset="-122"/>
-                        <a:cs typeface="Times New Roman" panose="02020603050405020304" pitchFamily="18" charset="0"/>
-                      </a:endParaRPr>
-                    </a:p>
-                  </a:txBody>
-                  <a:tcPr marL="44450" marR="44450" marT="0" marB="0" anchor="b"/>
-                </a:tc>
-                <a:tc>
-                  <a:txBody>
-                    <a:bodyPr/>
-                    <a:lstStyle/>
-                    <a:p>
-                      <a:pPr algn="just">
-                        <a:lnSpc>
-                          <a:spcPct val="107000"/>
-                        </a:lnSpc>
-                        <a:spcAft>
-                          <a:spcPts val="0"/>
-                        </a:spcAft>
-                      </a:pPr>
                       <a:r>
-                        <a:rPr lang="fr-FR" sz="1800" dirty="0" err="1">
+                        <a:rPr lang="fr-FR" sz="1800" dirty="0" smtClean="0">
                           <a:effectLst/>
                         </a:rPr>
-                        <a:t>number</a:t>
+                        <a:t>(10)</a:t>
                       </a:r>
                       <a:endParaRPr lang="fr-FR" sz="1800" dirty="0">
                         <a:effectLst/>
@@ -6567,14 +6593,14 @@
           <p:nvPr>
             <p:extLst>
               <p:ext uri="{D42A27DB-BD31-4B8C-83A1-F6EECF244321}">
-                <p14:modId xmlns:p14="http://schemas.microsoft.com/office/powerpoint/2010/main" val="2524177028"/>
+                <p14:modId xmlns:p14="http://schemas.microsoft.com/office/powerpoint/2010/main" val="289279832"/>
               </p:ext>
             </p:extLst>
           </p:nvPr>
         </p:nvGraphicFramePr>
         <p:xfrm>
-          <a:off x="1069848" y="3734502"/>
-          <a:ext cx="9651161" cy="1144234"/>
+          <a:off x="1069848" y="3786996"/>
+          <a:ext cx="9651161" cy="1091740"/>
         </p:xfrm>
         <a:graphic>
           <a:graphicData uri="http://schemas.openxmlformats.org/drawingml/2006/table">
@@ -6586,7 +6612,7 @@
                 <a:gridCol w="1414272"/>
                 <a:gridCol w="8236889"/>
               </a:tblGrid>
-              <a:tr h="453185">
+              <a:tr h="400691">
                 <a:tc>
                   <a:txBody>
                     <a:bodyPr/>
@@ -6808,6 +6834,13 @@
   <p:clrMapOvr>
     <a:masterClrMapping/>
   </p:clrMapOvr>
+  <p:timing>
+    <p:tnLst>
+      <p:par>
+        <p:cTn id="1" dur="indefinite" restart="never" nodeType="tmRoot"/>
+      </p:par>
+    </p:tnLst>
+  </p:timing>
 </p:sld>
 </file>
 
@@ -6868,7 +6901,9 @@
           </a:xfrm>
         </p:spPr>
         <p:txBody>
-          <a:bodyPr/>
+          <a:bodyPr>
+            <a:normAutofit/>
+          </a:bodyPr>
           <a:lstStyle/>
           <a:p>
             <a:r>
@@ -6877,6 +6912,10 @@
             </a:r>
           </a:p>
           <a:p>
+            <a:r>
+              <a:rPr lang="fr-FR" dirty="0" smtClean="0"/>
+              <a:t>Entités en jaune et relations en bleu</a:t>
+            </a:r>
             <a:endParaRPr lang="fr-FR" dirty="0"/>
           </a:p>
           <a:p>
@@ -6956,7 +6995,7 @@
         </p:blipFill>
         <p:spPr bwMode="auto">
           <a:xfrm>
-            <a:off x="2491410" y="291548"/>
+            <a:off x="2460930" y="1034498"/>
             <a:ext cx="9459798" cy="5880652"/>
           </a:xfrm>
           <a:prstGeom prst="rect">
@@ -6982,6 +7021,13 @@
   <p:clrMapOvr>
     <a:masterClrMapping/>
   </p:clrMapOvr>
+  <p:timing>
+    <p:tnLst>
+      <p:par>
+        <p:cTn id="1" dur="indefinite" restart="never" nodeType="tmRoot"/>
+      </p:par>
+    </p:tnLst>
+  </p:timing>
 </p:sld>
 </file>
 
@@ -7157,6 +7203,13 @@
   <p:clrMapOvr>
     <a:masterClrMapping/>
   </p:clrMapOvr>
+  <p:timing>
+    <p:tnLst>
+      <p:par>
+        <p:cTn id="1" dur="indefinite" restart="never" nodeType="tmRoot"/>
+      </p:par>
+    </p:tnLst>
+  </p:timing>
 </p:sld>
 </file>
 
@@ -8962,6 +9015,13 @@
   <p:clrMapOvr>
     <a:masterClrMapping/>
   </p:clrMapOvr>
+  <p:timing>
+    <p:tnLst>
+      <p:par>
+        <p:cTn id="1" dur="indefinite" restart="never" nodeType="tmRoot"/>
+      </p:par>
+    </p:tnLst>
+  </p:timing>
 </p:sld>
 </file>
 
@@ -9418,6 +9478,13 @@
   <p:clrMapOvr>
     <a:masterClrMapping/>
   </p:clrMapOvr>
+  <p:timing>
+    <p:tnLst>
+      <p:par>
+        <p:cTn id="1" dur="indefinite" restart="never" nodeType="tmRoot"/>
+      </p:par>
+    </p:tnLst>
+  </p:timing>
 </p:sld>
 </file>
 
@@ -9979,6 +10046,13 @@
   <p:clrMapOvr>
     <a:masterClrMapping/>
   </p:clrMapOvr>
+  <p:timing>
+    <p:tnLst>
+      <p:par>
+        <p:cTn id="1" dur="indefinite" restart="never" nodeType="tmRoot"/>
+      </p:par>
+    </p:tnLst>
+  </p:timing>
 </p:sld>
 </file>
 
@@ -10075,19 +10149,19 @@
       </p:sp>
       <p:pic>
         <p:nvPicPr>
-          <p:cNvPr id="9" name="Image 8"/>
+          <p:cNvPr id="10" name="Image 9"/>
           <p:cNvPicPr/>
           <p:nvPr/>
         </p:nvPicPr>
         <p:blipFill rotWithShape="1">
           <a:blip r:embed="rId2"/>
-          <a:srcRect l="7540" t="12344" r="4631" b="4541"/>
+          <a:srcRect l="10241" t="51796" r="59766" b="11008"/>
           <a:stretch/>
         </p:blipFill>
         <p:spPr bwMode="auto">
           <a:xfrm>
-            <a:off x="777240" y="1296924"/>
-            <a:ext cx="5059680" cy="4693920"/>
+            <a:off x="7024951" y="1578863"/>
+            <a:ext cx="5167049" cy="4259961"/>
           </a:xfrm>
           <a:prstGeom prst="rect">
             <a:avLst/>
@@ -10104,31 +10178,25 @@
       </p:pic>
       <p:pic>
         <p:nvPicPr>
-          <p:cNvPr id="10" name="Image 9"/>
-          <p:cNvPicPr/>
+          <p:cNvPr id="3" name="Image 2"/>
+          <p:cNvPicPr>
+            <a:picLocks noChangeAspect="1"/>
+          </p:cNvPicPr>
           <p:nvPr/>
         </p:nvPicPr>
         <p:blipFill rotWithShape="1">
           <a:blip r:embed="rId3"/>
-          <a:srcRect l="10241" t="51796" r="59766" b="11008"/>
+          <a:srcRect l="6933" t="16855" r="6361" b="8680"/>
           <a:stretch/>
         </p:blipFill>
-        <p:spPr bwMode="auto">
+        <p:spPr>
           <a:xfrm>
-            <a:off x="6148324" y="2045716"/>
-            <a:ext cx="4092956" cy="3196336"/>
+            <a:off x="917448" y="1165947"/>
+            <a:ext cx="6107503" cy="5106837"/>
           </a:xfrm>
           <a:prstGeom prst="rect">
             <a:avLst/>
           </a:prstGeom>
-          <a:ln>
-            <a:noFill/>
-          </a:ln>
-          <a:extLst>
-            <a:ext uri="{53640926-AAD7-44D8-BBD7-CCE9431645EC}">
-              <a14:shadowObscured xmlns:a14="http://schemas.microsoft.com/office/drawing/2010/main"/>
-            </a:ext>
-          </a:extLst>
         </p:spPr>
       </p:pic>
     </p:spTree>
@@ -10141,6 +10209,13 @@
   <p:clrMapOvr>
     <a:masterClrMapping/>
   </p:clrMapOvr>
+  <p:timing>
+    <p:tnLst>
+      <p:par>
+        <p:cTn id="1" dur="indefinite" restart="never" nodeType="tmRoot"/>
+      </p:par>
+    </p:tnLst>
+  </p:timing>
 </p:sld>
 </file>
 
@@ -10185,72 +10260,9 @@
               <a:rPr lang="fr-FR" dirty="0" err="1" smtClean="0"/>
               <a:t>dROITS</a:t>
             </a:r>
-            <a:endParaRPr lang="fr-FR" dirty="0"/>
-          </a:p>
-        </p:txBody>
-      </p:sp>
-      <p:sp>
-        <p:nvSpPr>
-          <p:cNvPr id="3" name="Espace réservé du contenu 2"/>
-          <p:cNvSpPr>
-            <a:spLocks noGrp="1"/>
-          </p:cNvSpPr>
-          <p:nvPr>
-            <p:ph idx="1"/>
-          </p:nvPr>
-        </p:nvSpPr>
-        <p:spPr/>
-        <p:txBody>
-          <a:bodyPr>
-            <a:normAutofit/>
-          </a:bodyPr>
-          <a:lstStyle/>
-          <a:p>
-            <a:endParaRPr lang="fr-FR" dirty="0" smtClean="0"/>
-          </a:p>
-          <a:p>
-            <a:endParaRPr lang="fr-FR" dirty="0"/>
-          </a:p>
-          <a:p>
-            <a:endParaRPr lang="fr-FR" dirty="0" smtClean="0"/>
-          </a:p>
-          <a:p>
-            <a:endParaRPr lang="fr-FR" dirty="0" smtClean="0"/>
-          </a:p>
-          <a:p>
-            <a:endParaRPr lang="fr-FR" dirty="0"/>
-          </a:p>
-          <a:p>
-            <a:endParaRPr lang="fr-FR" dirty="0" smtClean="0"/>
-          </a:p>
-          <a:p>
             <a:r>
               <a:rPr lang="fr-FR" dirty="0" smtClean="0"/>
-              <a:t>Accorder insert et update à photo pour adhérent?</a:t>
-            </a:r>
-          </a:p>
-          <a:p>
-            <a:pPr lvl="1"/>
-            <a:r>
-              <a:rPr lang="fr-FR" dirty="0" smtClean="0"/>
-              <a:t> mais comment contrôler qu’on ne modifie pas les photos des autres</a:t>
-            </a:r>
-          </a:p>
-          <a:p>
-            <a:r>
-              <a:rPr lang="fr-FR" dirty="0"/>
-              <a:t>A</a:t>
-            </a:r>
-            <a:r>
-              <a:rPr lang="fr-FR" dirty="0" smtClean="0"/>
-              <a:t>ccorder des droits à modifier la photo de profil utilisateur?</a:t>
-            </a:r>
-          </a:p>
-          <a:p>
-            <a:pPr lvl="1"/>
-            <a:r>
-              <a:rPr lang="fr-FR" dirty="0" smtClean="0"/>
-              <a:t> qui se trouve dans la table membre</a:t>
+              <a:t> utilisateurs</a:t>
             </a:r>
             <a:endParaRPr lang="fr-FR" dirty="0"/>
           </a:p>
@@ -10311,14 +10323,14 @@
           <p:nvPr>
             <p:extLst>
               <p:ext uri="{D42A27DB-BD31-4B8C-83A1-F6EECF244321}">
-                <p14:modId xmlns:p14="http://schemas.microsoft.com/office/powerpoint/2010/main" val="3055447349"/>
+                <p14:modId xmlns:p14="http://schemas.microsoft.com/office/powerpoint/2010/main" val="3421784742"/>
               </p:ext>
             </p:extLst>
           </p:nvPr>
         </p:nvGraphicFramePr>
         <p:xfrm>
-          <a:off x="1851660" y="1805940"/>
-          <a:ext cx="7261862" cy="2783840"/>
+          <a:off x="561978" y="1642620"/>
+          <a:ext cx="9892662" cy="4415284"/>
         </p:xfrm>
         <a:graphic>
           <a:graphicData uri="http://schemas.openxmlformats.org/drawingml/2006/table">
@@ -10327,16 +10339,16 @@
                 <a:tableStyleId>{5C22544A-7EE6-4342-B048-85BDC9FD1C3A}</a:tableStyleId>
               </a:tblPr>
               <a:tblGrid>
-                <a:gridCol w="1064890"/>
-                <a:gridCol w="855347"/>
-                <a:gridCol w="855347"/>
-                <a:gridCol w="855347"/>
-                <a:gridCol w="855347"/>
-                <a:gridCol w="1064890"/>
-                <a:gridCol w="855347"/>
-                <a:gridCol w="855347"/>
+                <a:gridCol w="1450674"/>
+                <a:gridCol w="1165219"/>
+                <a:gridCol w="1165219"/>
+                <a:gridCol w="1165219"/>
+                <a:gridCol w="1165219"/>
+                <a:gridCol w="1450674"/>
+                <a:gridCol w="1165219"/>
+                <a:gridCol w="1165219"/>
               </a:tblGrid>
-              <a:tr h="226060">
+              <a:tr h="551550">
                 <a:tc>
                   <a:txBody>
                     <a:bodyPr/>
@@ -10367,12 +10379,12 @@
                     <a:p>
                       <a:pPr algn="ctr" fontAlgn="b"/>
                       <a:r>
-                        <a:rPr lang="fr-FR" sz="1100" u="none" strike="noStrike" dirty="0">
+                        <a:rPr lang="fr-FR" sz="1400" b="1" u="sng" strike="noStrike" dirty="0">
                           <a:effectLst/>
                         </a:rPr>
                         <a:t>Organisateur</a:t>
                       </a:r>
-                      <a:endParaRPr lang="fr-FR" sz="1100" b="0" i="0" u="none" strike="noStrike" dirty="0">
+                      <a:endParaRPr lang="fr-FR" sz="1400" b="1" i="0" u="sng" strike="noStrike" dirty="0">
                         <a:solidFill>
                           <a:srgbClr val="000000"/>
                         </a:solidFill>
@@ -10444,7 +10456,7 @@
                   <a:tcPr/>
                 </a:tc>
               </a:tr>
-              <a:tr h="226060">
+              <a:tr h="341482">
                 <a:tc>
                   <a:txBody>
                     <a:bodyPr/>
@@ -10630,7 +10642,7 @@
                   <a:tcPr marL="0" marR="0" marT="0" marB="0" anchor="b"/>
                 </a:tc>
               </a:tr>
-              <a:tr h="226060">
+              <a:tr h="341482">
                 <a:tc>
                   <a:txBody>
                     <a:bodyPr/>
@@ -10816,7 +10828,7 @@
                   <a:tcPr marL="0" marR="0" marT="0" marB="0" anchor="b"/>
                 </a:tc>
               </a:tr>
-              <a:tr h="226060">
+              <a:tr h="341482">
                 <a:tc>
                   <a:txBody>
                     <a:bodyPr/>
@@ -11002,7 +11014,7 @@
                   <a:tcPr marL="0" marR="0" marT="0" marB="0" anchor="b"/>
                 </a:tc>
               </a:tr>
-              <a:tr h="226060">
+              <a:tr h="341482">
                 <a:tc>
                   <a:txBody>
                     <a:bodyPr/>
@@ -11188,7 +11200,7 @@
                   <a:tcPr marL="0" marR="0" marT="0" marB="0" anchor="b"/>
                 </a:tc>
               </a:tr>
-              <a:tr h="226060">
+              <a:tr h="341482">
                 <a:tc>
                   <a:txBody>
                     <a:bodyPr/>
@@ -11374,7 +11386,7 @@
                   <a:tcPr marL="0" marR="0" marT="0" marB="0" anchor="b"/>
                 </a:tc>
               </a:tr>
-              <a:tr h="297180">
+              <a:tr h="448914">
                 <a:tc>
                   <a:txBody>
                     <a:bodyPr/>
@@ -11399,12 +11411,12 @@
                     <a:p>
                       <a:pPr algn="ctr" fontAlgn="b"/>
                       <a:r>
-                        <a:rPr lang="fr-FR" sz="1100" u="none" strike="noStrike">
+                        <a:rPr lang="fr-FR" sz="1400" b="1" u="sng" strike="noStrike" dirty="0">
                           <a:effectLst/>
                         </a:rPr>
                         <a:t>Adhérent</a:t>
                       </a:r>
-                      <a:endParaRPr lang="fr-FR" sz="1100" b="0" i="0" u="none" strike="noStrike">
+                      <a:endParaRPr lang="fr-FR" sz="1400" b="1" i="0" u="sng" strike="noStrike" dirty="0">
                         <a:solidFill>
                           <a:srgbClr val="000000"/>
                         </a:solidFill>
@@ -11476,7 +11488,7 @@
                   <a:tcPr/>
                 </a:tc>
               </a:tr>
-              <a:tr h="226060">
+              <a:tr h="341482">
                 <a:tc>
                   <a:txBody>
                     <a:bodyPr/>
@@ -11662,7 +11674,7 @@
                   <a:tcPr marL="0" marR="0" marT="0" marB="0" anchor="b"/>
                 </a:tc>
               </a:tr>
-              <a:tr h="226060">
+              <a:tr h="341482">
                 <a:tc>
                   <a:txBody>
                     <a:bodyPr/>
@@ -11848,7 +11860,7 @@
                   <a:tcPr marL="0" marR="0" marT="0" marB="0" anchor="b"/>
                 </a:tc>
               </a:tr>
-              <a:tr h="226060">
+              <a:tr h="341482">
                 <a:tc>
                   <a:txBody>
                     <a:bodyPr/>
@@ -12034,7 +12046,7 @@
                   <a:tcPr marL="0" marR="0" marT="0" marB="0" anchor="b"/>
                 </a:tc>
               </a:tr>
-              <a:tr h="226060">
+              <a:tr h="341482">
                 <a:tc>
                   <a:txBody>
                     <a:bodyPr/>
@@ -12203,12 +12215,12 @@
                     <a:p>
                       <a:pPr algn="ctr" fontAlgn="b"/>
                       <a:r>
-                        <a:rPr lang="fr-FR" sz="1100" u="none" strike="noStrike">
+                        <a:rPr lang="fr-FR" sz="1100" u="none" strike="noStrike" dirty="0">
                           <a:effectLst/>
                         </a:rPr>
                         <a:t>X</a:t>
                       </a:r>
-                      <a:endParaRPr lang="fr-FR" sz="1100" b="0" i="0" u="none" strike="noStrike">
+                      <a:endParaRPr lang="fr-FR" sz="1100" b="0" i="0" u="none" strike="noStrike" dirty="0">
                         <a:solidFill>
                           <a:srgbClr val="000000"/>
                         </a:solidFill>
@@ -12220,7 +12232,7 @@
                   <a:tcPr marL="0" marR="0" marT="0" marB="0" anchor="b"/>
                 </a:tc>
               </a:tr>
-              <a:tr h="226060">
+              <a:tr h="341482">
                 <a:tc>
                   <a:txBody>
                     <a:bodyPr/>
@@ -12735,6 +12747,13 @@
   <p:clrMapOvr>
     <a:masterClrMapping/>
   </p:clrMapOvr>
+  <p:timing>
+    <p:tnLst>
+      <p:par>
+        <p:cTn id="1" dur="indefinite" restart="never" nodeType="tmRoot"/>
+      </p:par>
+    </p:tnLst>
+  </p:timing>
 </p:sld>
 </file>
 
@@ -12802,7 +12821,15 @@
           <a:p>
             <a:r>
               <a:rPr lang="fr-FR" dirty="0"/>
-              <a:t>L'export de la base de donnée se fait </a:t>
+              <a:t>L'export de la base de </a:t>
+            </a:r>
+            <a:r>
+              <a:rPr lang="fr-FR" dirty="0" smtClean="0"/>
+              <a:t>données </a:t>
+            </a:r>
+            <a:r>
+              <a:rPr lang="fr-FR" dirty="0"/>
+              <a:t>se fait </a:t>
             </a:r>
             <a:r>
               <a:rPr lang="fr-FR" dirty="0" smtClean="0"/>
@@ -12959,6 +12986,13 @@
   <p:clrMapOvr>
     <a:masterClrMapping/>
   </p:clrMapOvr>
+  <p:timing>
+    <p:tnLst>
+      <p:par>
+        <p:cTn id="1" dur="indefinite" restart="never" nodeType="tmRoot"/>
+      </p:par>
+    </p:tnLst>
+  </p:timing>
 </p:sld>
 </file>
 
@@ -13021,7 +13055,6 @@
               <a:rPr lang="fr-FR" dirty="0" smtClean="0"/>
               <a:t>Présentation personnelle</a:t>
             </a:r>
-            <a:endParaRPr lang="fr-FR" dirty="0" smtClean="0"/>
           </a:p>
           <a:p>
             <a:r>
@@ -13149,84 +13182,56 @@
           <a:chExt cx="0" cy="0"/>
         </a:xfrm>
       </p:grpSpPr>
-      <p:sp>
-        <p:nvSpPr>
-          <p:cNvPr id="2" name="Titre 1"/>
-          <p:cNvSpPr>
-            <a:spLocks noGrp="1"/>
-          </p:cNvSpPr>
-          <p:nvPr>
-            <p:ph type="title"/>
-          </p:nvPr>
-        </p:nvSpPr>
-        <p:spPr/>
-        <p:txBody>
-          <a:bodyPr/>
-          <a:lstStyle/>
-          <a:p>
-            <a:r>
-              <a:rPr lang="fr-FR" dirty="0" smtClean="0"/>
-              <a:t>Bilan - </a:t>
-            </a:r>
-            <a:r>
-              <a:rPr lang="fr-FR" dirty="0"/>
-              <a:t>Gestion du temps </a:t>
-            </a:r>
-          </a:p>
-        </p:txBody>
-      </p:sp>
-      <p:sp>
-        <p:nvSpPr>
-          <p:cNvPr id="3" name="Espace réservé du contenu 2"/>
-          <p:cNvSpPr>
-            <a:spLocks noGrp="1"/>
-          </p:cNvSpPr>
-          <p:nvPr>
-            <p:ph idx="1"/>
-          </p:nvPr>
-        </p:nvSpPr>
-        <p:spPr/>
-        <p:txBody>
-          <a:bodyPr/>
-          <a:lstStyle/>
-          <a:p>
-            <a:endParaRPr lang="fr-FR" dirty="0"/>
-          </a:p>
-        </p:txBody>
-      </p:sp>
       <p:pic>
         <p:nvPicPr>
-          <p:cNvPr id="4" name="Image 3"/>
-          <p:cNvPicPr/>
+          <p:cNvPr id="10" name="Image 9"/>
+          <p:cNvPicPr>
+            <a:picLocks noChangeAspect="1"/>
+          </p:cNvPicPr>
           <p:nvPr/>
         </p:nvPicPr>
         <p:blipFill>
-          <a:blip r:embed="rId2">
-            <a:extLst>
-              <a:ext uri="{28A0092B-C50C-407E-A947-70E740481C1C}">
-                <a14:useLocalDpi xmlns:a14="http://schemas.microsoft.com/office/drawing/2010/main" val="0"/>
-              </a:ext>
-            </a:extLst>
-          </a:blip>
-          <a:srcRect/>
+          <a:blip r:embed="rId2"/>
           <a:stretch>
             <a:fillRect/>
           </a:stretch>
         </p:blipFill>
-        <p:spPr bwMode="auto">
+        <p:spPr>
           <a:xfrm>
-            <a:off x="760331" y="1597266"/>
-            <a:ext cx="8823615" cy="5139963"/>
+            <a:off x="828054" y="1758981"/>
+            <a:ext cx="8755892" cy="5099019"/>
           </a:xfrm>
           <a:prstGeom prst="rect">
             <a:avLst/>
           </a:prstGeom>
-          <a:noFill/>
-          <a:ln>
-            <a:noFill/>
-          </a:ln>
         </p:spPr>
       </p:pic>
+      <p:sp>
+        <p:nvSpPr>
+          <p:cNvPr id="2" name="Titre 1"/>
+          <p:cNvSpPr>
+            <a:spLocks noGrp="1"/>
+          </p:cNvSpPr>
+          <p:nvPr>
+            <p:ph type="title"/>
+          </p:nvPr>
+        </p:nvSpPr>
+        <p:spPr/>
+        <p:txBody>
+          <a:bodyPr/>
+          <a:lstStyle/>
+          <a:p>
+            <a:r>
+              <a:rPr lang="fr-FR" dirty="0" smtClean="0"/>
+              <a:t>Bilan - </a:t>
+            </a:r>
+            <a:r>
+              <a:rPr lang="fr-FR" dirty="0"/>
+              <a:t>Gestion du temps </a:t>
+            </a:r>
+          </a:p>
+        </p:txBody>
+      </p:sp>
       <p:sp>
         <p:nvSpPr>
           <p:cNvPr id="5" name="Espace réservé du pied de page 4"/>
@@ -13237,13 +13242,18 @@
             <p:ph type="ftr" sz="quarter" idx="11"/>
           </p:nvPr>
         </p:nvSpPr>
-        <p:spPr/>
+        <p:spPr>
+          <a:xfrm>
+            <a:off x="5623560" y="6272783"/>
+            <a:ext cx="6327648" cy="365125"/>
+          </a:xfrm>
+        </p:spPr>
         <p:txBody>
           <a:bodyPr/>
           <a:lstStyle/>
           <a:p>
             <a:r>
-              <a:rPr lang="en-US" smtClean="0"/>
+              <a:rPr lang="en-US" dirty="0" smtClean="0"/>
               <a:t>Emilie Paniagua - CDA05</a:t>
             </a:r>
             <a:endParaRPr lang="en-US" dirty="0"/>
@@ -13281,8 +13291,8 @@
         </p:nvSpPr>
         <p:spPr>
           <a:xfrm>
-            <a:off x="6873240" y="2941320"/>
-            <a:ext cx="2710706" cy="205740"/>
+            <a:off x="6873240" y="2990160"/>
+            <a:ext cx="2710706" cy="175734"/>
           </a:xfrm>
           <a:prstGeom prst="rect">
             <a:avLst/>
@@ -13329,8 +13339,8 @@
         </p:nvSpPr>
         <p:spPr>
           <a:xfrm>
-            <a:off x="6873240" y="2428494"/>
-            <a:ext cx="2710706" cy="205740"/>
+            <a:off x="6873240" y="2449902"/>
+            <a:ext cx="2710706" cy="184332"/>
           </a:xfrm>
           <a:prstGeom prst="rect">
             <a:avLst/>
@@ -13377,7 +13387,7 @@
         </p:nvSpPr>
         <p:spPr>
           <a:xfrm>
-            <a:off x="6873240" y="3798570"/>
+            <a:off x="6873240" y="3874770"/>
             <a:ext cx="2710706" cy="205740"/>
           </a:xfrm>
           <a:prstGeom prst="rect">
@@ -13504,8 +13514,16 @@
           <a:lstStyle/>
           <a:p>
             <a:r>
-              <a:rPr lang="fr-FR" dirty="0" smtClean="0"/>
-              <a:t>J’ai développé des compétences en : </a:t>
+              <a:rPr lang="fr-FR" b="1" dirty="0" smtClean="0"/>
+              <a:t>Compétences techniques acquises</a:t>
+            </a:r>
+            <a:r>
+              <a:rPr lang="fr-FR" b="1" dirty="0" smtClean="0"/>
+              <a:t> </a:t>
+            </a:r>
+            <a:r>
+              <a:rPr lang="fr-FR" b="1" dirty="0" smtClean="0"/>
+              <a:t>: </a:t>
             </a:r>
           </a:p>
           <a:p>
@@ -13536,7 +13554,7 @@
           </a:p>
           <a:p>
             <a:r>
-              <a:rPr lang="fr-FR" dirty="0" smtClean="0"/>
+              <a:rPr lang="fr-FR" b="1" dirty="0" smtClean="0"/>
               <a:t>Difficultés : </a:t>
             </a:r>
           </a:p>
@@ -13567,8 +13585,16 @@
           </a:p>
           <a:p>
             <a:r>
-              <a:rPr lang="fr-FR" dirty="0" smtClean="0"/>
-              <a:t>Compétences non techniques : </a:t>
+              <a:rPr lang="fr-FR" b="1" dirty="0" smtClean="0"/>
+              <a:t>Compétences non </a:t>
+            </a:r>
+            <a:r>
+              <a:rPr lang="fr-FR" b="1" dirty="0" smtClean="0"/>
+              <a:t>techniques développées </a:t>
+            </a:r>
+            <a:r>
+              <a:rPr lang="fr-FR" b="1" dirty="0" smtClean="0"/>
+              <a:t>: </a:t>
             </a:r>
           </a:p>
           <a:p>
@@ -13636,6 +13662,13 @@
   <p:clrMapOvr>
     <a:masterClrMapping/>
   </p:clrMapOvr>
+  <p:timing>
+    <p:tnLst>
+      <p:par>
+        <p:cTn id="1" dur="indefinite" restart="never" nodeType="tmRoot"/>
+      </p:par>
+    </p:tnLst>
+  </p:timing>
 </p:sld>
 </file>
 
@@ -13740,6 +13773,13 @@
   <p:clrMapOvr>
     <a:masterClrMapping/>
   </p:clrMapOvr>
+  <p:timing>
+    <p:tnLst>
+      <p:par>
+        <p:cTn id="1" dur="indefinite" restart="never" nodeType="tmRoot"/>
+      </p:par>
+    </p:tnLst>
+  </p:timing>
 </p:sld>
 </file>
 
@@ -13804,8 +13844,13 @@
           <a:p>
             <a:r>
               <a:rPr lang="fr-FR" dirty="0" smtClean="0"/>
-              <a:t>Emilie Paniagua, 38 ans, originaire d’auvergne</a:t>
-            </a:r>
+              <a:t>Emilie Paniagua, 38 ans, originaire </a:t>
+            </a:r>
+            <a:r>
+              <a:rPr lang="fr-FR" dirty="0" smtClean="0"/>
+              <a:t>d’Auvergne</a:t>
+            </a:r>
+            <a:endParaRPr lang="fr-FR" dirty="0" smtClean="0"/>
           </a:p>
           <a:p>
             <a:r>
@@ -14208,20 +14253,54 @@
           <a:p>
             <a:r>
               <a:rPr lang="fr-FR" dirty="0" smtClean="0"/>
-              <a:t>Propose des sorties en deux roues motorisées</a:t>
-            </a:r>
-          </a:p>
-          <a:p>
+              <a:t>Sorties </a:t>
+            </a:r>
             <a:r>
               <a:rPr lang="fr-FR" dirty="0" smtClean="0"/>
-              <a:t>A des adhérents, des organisateurs, des invités</a:t>
+              <a:t>en deux roues motorisées</a:t>
             </a:r>
           </a:p>
           <a:p>
             <a:r>
               <a:rPr lang="fr-FR" dirty="0" smtClean="0"/>
-              <a:t>Aimerait une application pour gérer la  communication, les inscriptions</a:t>
-            </a:r>
+              <a:t>Les participants : </a:t>
+            </a:r>
+            <a:r>
+              <a:rPr lang="fr-FR" dirty="0" smtClean="0"/>
+              <a:t>des </a:t>
+            </a:r>
+            <a:r>
+              <a:rPr lang="fr-FR" dirty="0" smtClean="0"/>
+              <a:t>adhérents, des organisateurs, des </a:t>
+            </a:r>
+            <a:r>
+              <a:rPr lang="fr-FR" dirty="0" smtClean="0"/>
+              <a:t>invités</a:t>
+            </a:r>
+          </a:p>
+          <a:p>
+            <a:endParaRPr lang="fr-FR" dirty="0"/>
+          </a:p>
+          <a:p>
+            <a:endParaRPr lang="fr-FR" dirty="0" smtClean="0"/>
+          </a:p>
+          <a:p>
+            <a:pPr marL="0" indent="0">
+              <a:buNone/>
+            </a:pPr>
+            <a:r>
+              <a:rPr lang="fr-FR" dirty="0" smtClean="0"/>
+              <a:t>=&gt;Souhait : une </a:t>
+            </a:r>
+            <a:r>
+              <a:rPr lang="fr-FR" dirty="0" smtClean="0"/>
+              <a:t>application pour gérer la  communication, </a:t>
+            </a:r>
+            <a:r>
+              <a:rPr lang="fr-FR" dirty="0" smtClean="0"/>
+              <a:t>les adhésions, les inscriptions aux sorties</a:t>
+            </a:r>
+            <a:endParaRPr lang="fr-FR" dirty="0" smtClean="0"/>
           </a:p>
           <a:p>
             <a:endParaRPr lang="fr-FR" dirty="0"/>
@@ -14366,40 +14445,48 @@
           <a:p>
             <a:r>
               <a:rPr lang="fr-FR" dirty="0" smtClean="0"/>
-              <a:t>Objectifs : </a:t>
-            </a:r>
+              <a:t>Liste des compétences mises en œuvre : </a:t>
+            </a:r>
+            <a:endParaRPr lang="fr-FR" dirty="0" smtClean="0"/>
           </a:p>
           <a:p>
             <a:pPr lvl="1"/>
             <a:r>
+              <a:rPr lang="fr-FR" b="1" u="sng" dirty="0" smtClean="0"/>
+              <a:t>Concevoir </a:t>
+            </a:r>
+            <a:r>
+              <a:rPr lang="fr-FR" b="1" u="sng" dirty="0"/>
+              <a:t>une base de </a:t>
+            </a:r>
+            <a:r>
+              <a:rPr lang="fr-FR" b="1" u="sng" dirty="0" smtClean="0"/>
+              <a:t>données (BDD)</a:t>
+            </a:r>
+          </a:p>
+          <a:p>
+            <a:pPr lvl="2"/>
+            <a:r>
               <a:rPr lang="fr-FR" dirty="0" smtClean="0"/>
-              <a:t>Concevoir </a:t>
-            </a:r>
-            <a:r>
-              <a:rPr lang="fr-FR" dirty="0"/>
-              <a:t>une base de </a:t>
+              <a:t>Outils d’analyse du cahier des </a:t>
             </a:r>
             <a:r>
               <a:rPr lang="fr-FR" dirty="0" smtClean="0"/>
-              <a:t>données (BDD)</a:t>
+              <a:t>charges</a:t>
             </a:r>
           </a:p>
           <a:p>
             <a:pPr lvl="2"/>
-            <a:r>
-              <a:rPr lang="fr-FR" dirty="0" smtClean="0"/>
-              <a:t>Outils d’analyse du cahier des charges</a:t>
-            </a:r>
             <a:endParaRPr lang="fr-FR" dirty="0"/>
           </a:p>
           <a:p>
             <a:pPr lvl="1"/>
             <a:r>
-              <a:rPr lang="fr-FR" dirty="0"/>
+              <a:rPr lang="fr-FR" b="1" u="sng" dirty="0"/>
               <a:t>Mettre en place une base de </a:t>
             </a:r>
             <a:r>
-              <a:rPr lang="fr-FR" dirty="0" smtClean="0"/>
+              <a:rPr lang="fr-FR" b="1" u="sng" dirty="0" smtClean="0"/>
               <a:t>données</a:t>
             </a:r>
           </a:p>
@@ -14413,25 +14500,33 @@
           <a:p>
             <a:pPr lvl="2"/>
             <a:r>
-              <a:rPr lang="fr-FR" dirty="0" err="1" smtClean="0"/>
-              <a:t>Requêtages</a:t>
-            </a:r>
-            <a:r>
               <a:rPr lang="fr-FR" dirty="0" smtClean="0"/>
-              <a:t> de tests</a:t>
-            </a:r>
+              <a:t>Requêtes </a:t>
+            </a:r>
+            <a:r>
+              <a:rPr lang="fr-FR" dirty="0" smtClean="0"/>
+              <a:t>de </a:t>
+            </a:r>
+            <a:r>
+              <a:rPr lang="fr-FR" dirty="0" smtClean="0"/>
+              <a:t>tests</a:t>
+            </a:r>
+          </a:p>
+          <a:p>
+            <a:pPr lvl="2"/>
             <a:endParaRPr lang="fr-FR" dirty="0"/>
           </a:p>
           <a:p>
             <a:pPr lvl="1"/>
             <a:r>
-              <a:rPr lang="fr-FR" dirty="0"/>
+              <a:rPr lang="fr-FR" b="1" u="sng" dirty="0"/>
               <a:t>Développer des composants dans le langage d'une base de </a:t>
             </a:r>
             <a:r>
-              <a:rPr lang="fr-FR" dirty="0" smtClean="0"/>
-              <a:t>donnée</a:t>
-            </a:r>
+              <a:rPr lang="fr-FR" b="1" u="sng" dirty="0" smtClean="0"/>
+              <a:t>données</a:t>
+            </a:r>
+            <a:endParaRPr lang="fr-FR" b="1" u="sng" dirty="0" smtClean="0"/>
           </a:p>
           <a:p>
             <a:pPr lvl="2"/>
@@ -14667,17 +14762,27 @@
           <a:p>
             <a:pPr lvl="1"/>
             <a:r>
-              <a:rPr lang="fr-FR" dirty="0" smtClean="0"/>
+              <a:rPr lang="fr-FR" dirty="0" smtClean="0">
+                <a:hlinkClick r:id="rId2"/>
+              </a:rPr>
               <a:t>Enregistrement avec Git et </a:t>
             </a:r>
             <a:r>
-              <a:rPr lang="fr-FR" dirty="0" err="1" smtClean="0"/>
+              <a:rPr lang="fr-FR" dirty="0" err="1" smtClean="0">
+                <a:hlinkClick r:id="rId2"/>
+              </a:rPr>
               <a:t>Github</a:t>
             </a:r>
             <a:endParaRPr lang="fr-FR" dirty="0" smtClean="0"/>
           </a:p>
           <a:p>
-            <a:pPr lvl="2"/>
+            <a:pPr lvl="1"/>
+            <a:endParaRPr lang="fr-FR" dirty="0" smtClean="0"/>
+          </a:p>
+          <a:p>
+            <a:pPr marL="548640" lvl="2" indent="0">
+              <a:buNone/>
+            </a:pPr>
             <a:endParaRPr lang="fr-FR" dirty="0"/>
           </a:p>
           <a:p>
@@ -14696,7 +14801,7 @@
           <p:nvPr/>
         </p:nvPicPr>
         <p:blipFill rotWithShape="1">
-          <a:blip r:embed="rId2">
+          <a:blip r:embed="rId3">
             <a:extLst>
               <a:ext uri="{28A0092B-C50C-407E-A947-70E740481C1C}">
                 <a14:useLocalDpi xmlns:a14="http://schemas.microsoft.com/office/drawing/2010/main" val="0"/>
@@ -14853,7 +14958,7 @@
         </p:nvSpPr>
         <p:spPr>
           <a:xfrm>
-            <a:off x="1069848" y="484632"/>
+            <a:off x="379734" y="553643"/>
             <a:ext cx="3390009" cy="5200176"/>
           </a:xfrm>
         </p:spPr>
@@ -14865,7 +14970,15 @@
           <a:p>
             <a:r>
               <a:rPr lang="fr-FR" dirty="0" smtClean="0"/>
-              <a:t>Analyse des besoin – use case</a:t>
+              <a:t>Analyse des </a:t>
+            </a:r>
+            <a:r>
+              <a:rPr lang="fr-FR" dirty="0" smtClean="0"/>
+              <a:t>besoins </a:t>
+            </a:r>
+            <a:r>
+              <a:rPr lang="fr-FR" dirty="0" smtClean="0"/>
+              <a:t>– use case</a:t>
             </a:r>
             <a:endParaRPr lang="fr-FR" dirty="0"/>
           </a:p>
@@ -14927,6 +15040,13 @@
   <p:clrMapOvr>
     <a:masterClrMapping/>
   </p:clrMapOvr>
+  <p:timing>
+    <p:tnLst>
+      <p:par>
+        <p:cTn id="1" dur="indefinite" restart="never" nodeType="tmRoot"/>
+      </p:par>
+    </p:tnLst>
+  </p:timing>
 </p:sld>
 </file>
 
@@ -14959,8 +15079,8 @@
         </p:nvSpPr>
         <p:spPr>
           <a:xfrm>
-            <a:off x="1069848" y="47178"/>
-            <a:ext cx="10058400" cy="1609344"/>
+            <a:off x="1088136" y="75906"/>
+            <a:ext cx="10058400" cy="987235"/>
           </a:xfrm>
         </p:spPr>
         <p:txBody>
@@ -14987,264 +15107,329 @@
         </p:nvSpPr>
         <p:spPr>
           <a:xfrm>
-            <a:off x="1088136" y="1063141"/>
-            <a:ext cx="10340274" cy="5392205"/>
+            <a:off x="77638" y="836763"/>
+            <a:ext cx="11350772" cy="5801146"/>
           </a:xfrm>
         </p:spPr>
         <p:txBody>
           <a:bodyPr>
-            <a:normAutofit lnSpcReduction="10000"/>
+            <a:normAutofit/>
           </a:bodyPr>
           <a:lstStyle/>
           <a:p>
-            <a:pPr>
+            <a:pPr marL="0" indent="0">
               <a:spcBef>
                 <a:spcPts val="0"/>
               </a:spcBef>
+              <a:buNone/>
             </a:pPr>
             <a:r>
-              <a:rPr lang="fr-FR" u="sng" dirty="0"/>
-              <a:t>Cas : "Ajouter sa photo de profil"</a:t>
-            </a:r>
-            <a:endParaRPr lang="fr-FR" dirty="0"/>
-          </a:p>
-          <a:p>
-            <a:pPr>
+              <a:rPr lang="fr-FR" sz="1600" b="1" dirty="0" smtClean="0"/>
+              <a:t>Objectif </a:t>
+            </a:r>
+            <a:r>
+              <a:rPr lang="fr-FR" sz="1600" b="1" dirty="0"/>
+              <a:t>:</a:t>
+            </a:r>
+            <a:r>
+              <a:rPr lang="fr-FR" sz="1600" dirty="0"/>
+              <a:t> Permettre d'ajouter sa photo de profil.</a:t>
+            </a:r>
+          </a:p>
+          <a:p>
+            <a:pPr marL="0" indent="0">
               <a:spcBef>
                 <a:spcPts val="0"/>
               </a:spcBef>
+              <a:buNone/>
             </a:pPr>
             <a:r>
-              <a:rPr lang="fr-FR" b="1" dirty="0"/>
-              <a:t>Objectif :</a:t>
-            </a:r>
-            <a:r>
-              <a:rPr lang="fr-FR" dirty="0"/>
-              <a:t> Permettre d'ajouter sa photo de profil.</a:t>
-            </a:r>
-          </a:p>
-          <a:p>
-            <a:pPr>
+              <a:rPr lang="fr-FR" sz="1600" b="1" dirty="0"/>
+              <a:t>Acteurs :</a:t>
+            </a:r>
+            <a:r>
+              <a:rPr lang="fr-FR" sz="1600" dirty="0"/>
+              <a:t> l'adhérent</a:t>
+            </a:r>
+          </a:p>
+          <a:p>
+            <a:pPr marL="0" indent="0">
               <a:spcBef>
                 <a:spcPts val="0"/>
               </a:spcBef>
+              <a:buNone/>
             </a:pPr>
             <a:r>
-              <a:rPr lang="fr-FR" b="1" dirty="0"/>
-              <a:t>Acteurs :</a:t>
-            </a:r>
-            <a:r>
-              <a:rPr lang="fr-FR" dirty="0"/>
-              <a:t> l'adhérent</a:t>
-            </a:r>
-          </a:p>
-          <a:p>
-            <a:pPr>
+              <a:rPr lang="fr-FR" sz="1600" b="1" dirty="0"/>
+              <a:t>Date :</a:t>
+            </a:r>
+            <a:r>
+              <a:rPr lang="fr-FR" sz="1600" dirty="0"/>
+              <a:t> le 17/08/2021</a:t>
+            </a:r>
+          </a:p>
+          <a:p>
+            <a:pPr marL="0" indent="0">
               <a:spcBef>
                 <a:spcPts val="0"/>
               </a:spcBef>
+              <a:buNone/>
             </a:pPr>
             <a:r>
-              <a:rPr lang="fr-FR" b="1" dirty="0"/>
-              <a:t>Date :</a:t>
-            </a:r>
-            <a:r>
-              <a:rPr lang="fr-FR" dirty="0"/>
-              <a:t> le 17/08/2021</a:t>
-            </a:r>
-          </a:p>
-          <a:p>
-            <a:pPr>
+              <a:rPr lang="fr-FR" sz="1600" b="1" dirty="0"/>
+              <a:t>Responsable :</a:t>
+            </a:r>
+            <a:r>
+              <a:rPr lang="fr-FR" sz="1600" dirty="0"/>
+              <a:t> Emilie Paniagua</a:t>
+            </a:r>
+          </a:p>
+          <a:p>
+            <a:pPr marL="0" indent="0">
               <a:spcBef>
                 <a:spcPts val="0"/>
               </a:spcBef>
+              <a:buNone/>
             </a:pPr>
             <a:r>
-              <a:rPr lang="fr-FR" b="1" dirty="0"/>
-              <a:t>Responsable :</a:t>
-            </a:r>
-            <a:r>
-              <a:rPr lang="fr-FR" dirty="0"/>
-              <a:t> Emilie Paniagua</a:t>
-            </a:r>
-          </a:p>
-          <a:p>
-            <a:pPr>
+              <a:rPr lang="fr-FR" sz="1600" b="1" dirty="0"/>
+              <a:t>Version :</a:t>
+            </a:r>
+            <a:r>
+              <a:rPr lang="fr-FR" sz="1600" dirty="0"/>
+              <a:t> </a:t>
+            </a:r>
+            <a:r>
+              <a:rPr lang="fr-FR" sz="1600" dirty="0" smtClean="0"/>
+              <a:t>3.0</a:t>
+            </a:r>
+          </a:p>
+          <a:p>
+            <a:pPr marL="0" indent="0">
               <a:spcBef>
                 <a:spcPts val="0"/>
               </a:spcBef>
+              <a:buNone/>
             </a:pPr>
-            <a:r>
-              <a:rPr lang="fr-FR" b="1" dirty="0"/>
-              <a:t>Version :</a:t>
-            </a:r>
-            <a:r>
-              <a:rPr lang="fr-FR" dirty="0"/>
-              <a:t> 3.0</a:t>
-            </a:r>
-          </a:p>
-          <a:p>
-            <a:pPr>
+            <a:endParaRPr lang="fr-FR" sz="1600" dirty="0"/>
+          </a:p>
+          <a:p>
+            <a:pPr marL="0" indent="0">
               <a:spcBef>
                 <a:spcPts val="0"/>
               </a:spcBef>
+              <a:buNone/>
             </a:pPr>
             <a:r>
-              <a:rPr lang="fr-FR" b="1" dirty="0"/>
+              <a:rPr lang="fr-FR" sz="1600" b="1" dirty="0"/>
               <a:t>Préconditions : </a:t>
             </a:r>
             <a:r>
-              <a:rPr lang="fr-FR" dirty="0"/>
-              <a:t>l'adhérent visualise ses informations personnelles. Le système présente une photo de profil par défaut.</a:t>
-            </a:r>
-          </a:p>
-          <a:p>
-            <a:pPr>
+              <a:rPr lang="fr-FR" sz="1600" dirty="0"/>
+              <a:t>l'adhérent visualise ses informations personnelles. Le système présente une photo de profil par défaut</a:t>
+            </a:r>
+            <a:r>
+              <a:rPr lang="fr-FR" sz="1600" dirty="0" smtClean="0"/>
+              <a:t>.</a:t>
+            </a:r>
+          </a:p>
+          <a:p>
+            <a:pPr marL="0" indent="0">
               <a:spcBef>
                 <a:spcPts val="0"/>
               </a:spcBef>
+              <a:buNone/>
             </a:pPr>
-            <a:r>
-              <a:rPr lang="fr-FR" b="1" dirty="0"/>
-              <a:t>Scénario : </a:t>
-            </a:r>
-            <a:endParaRPr lang="fr-FR" dirty="0"/>
-          </a:p>
-          <a:p>
-            <a:pPr lvl="1">
+            <a:endParaRPr lang="fr-FR" sz="1600" dirty="0"/>
+          </a:p>
+          <a:p>
+            <a:pPr marL="0" indent="0">
               <a:spcBef>
                 <a:spcPts val="0"/>
               </a:spcBef>
+              <a:buNone/>
             </a:pPr>
             <a:r>
-              <a:rPr lang="fr-FR" dirty="0"/>
-              <a:t>L'adhérent choisit une photo depuis sa galerie ou son ordinateur</a:t>
-            </a:r>
-          </a:p>
-          <a:p>
-            <a:pPr lvl="1">
+              <a:rPr lang="fr-FR" sz="1600" b="1" dirty="0"/>
+              <a:t>Scénario : </a:t>
+            </a:r>
+            <a:endParaRPr lang="fr-FR" sz="1600" dirty="0"/>
+          </a:p>
+          <a:p>
+            <a:pPr marL="274320" lvl="1" indent="0">
               <a:spcBef>
                 <a:spcPts val="0"/>
               </a:spcBef>
+              <a:buNone/>
             </a:pPr>
             <a:r>
-              <a:rPr lang="fr-FR" dirty="0"/>
-              <a:t>L'adhérent valide son choix de photo</a:t>
-            </a:r>
-          </a:p>
-          <a:p>
-            <a:pPr lvl="1">
+              <a:rPr lang="fr-FR" sz="1600" dirty="0"/>
+              <a:t>L'adhérent choisit une photo depuis sa galerie ou son ordinateur</a:t>
+            </a:r>
+          </a:p>
+          <a:p>
+            <a:pPr marL="274320" lvl="1" indent="0">
               <a:spcBef>
                 <a:spcPts val="0"/>
               </a:spcBef>
+              <a:buNone/>
             </a:pPr>
             <a:r>
-              <a:rPr lang="fr-FR" dirty="0"/>
-              <a:t>Le système stocke la photo associée à </a:t>
-            </a:r>
-            <a:r>
-              <a:rPr lang="fr-FR" dirty="0" smtClean="0"/>
-              <a:t>l'utilisateur</a:t>
-            </a:r>
-            <a:endParaRPr lang="fr-FR" dirty="0"/>
-          </a:p>
-          <a:p>
-            <a:pPr>
+              <a:rPr lang="fr-FR" sz="1600" dirty="0"/>
+              <a:t>L'adhérent valide son choix de photo</a:t>
+            </a:r>
+          </a:p>
+          <a:p>
+            <a:pPr marL="274320" lvl="1" indent="0">
               <a:spcBef>
                 <a:spcPts val="0"/>
               </a:spcBef>
+              <a:buNone/>
             </a:pPr>
             <a:r>
-              <a:rPr lang="fr-FR" b="1" dirty="0"/>
-              <a:t>Alternatives : </a:t>
-            </a:r>
-            <a:endParaRPr lang="fr-FR" dirty="0"/>
-          </a:p>
-          <a:p>
-            <a:pPr lvl="1">
+              <a:rPr lang="fr-FR" sz="1600" dirty="0"/>
+              <a:t>Le système stocke la photo associée à </a:t>
+            </a:r>
+            <a:r>
+              <a:rPr lang="fr-FR" sz="1600" dirty="0" smtClean="0"/>
+              <a:t>l'utilisateur</a:t>
+            </a:r>
+          </a:p>
+          <a:p>
+            <a:pPr marL="274320" lvl="1" indent="0">
               <a:spcBef>
                 <a:spcPts val="0"/>
               </a:spcBef>
+              <a:buNone/>
             </a:pPr>
-            <a:r>
-              <a:rPr lang="fr-FR" dirty="0"/>
-              <a:t>L'adhérent ne choisit pas de photo de profil</a:t>
-            </a:r>
-          </a:p>
-          <a:p>
-            <a:pPr lvl="1">
+            <a:endParaRPr lang="fr-FR" sz="1600" dirty="0"/>
+          </a:p>
+          <a:p>
+            <a:pPr marL="0" indent="0">
               <a:spcBef>
                 <a:spcPts val="0"/>
               </a:spcBef>
+              <a:buNone/>
             </a:pPr>
             <a:r>
-              <a:rPr lang="fr-FR" dirty="0"/>
-              <a:t>Le  système laisse un avatar par défaut</a:t>
-            </a:r>
-          </a:p>
-          <a:p>
-            <a:pPr>
+              <a:rPr lang="fr-FR" sz="1600" b="1" dirty="0"/>
+              <a:t>Alternatives : </a:t>
+            </a:r>
+            <a:endParaRPr lang="fr-FR" sz="1600" dirty="0"/>
+          </a:p>
+          <a:p>
+            <a:pPr marL="274320" lvl="1" indent="0">
               <a:spcBef>
                 <a:spcPts val="0"/>
               </a:spcBef>
+              <a:buNone/>
             </a:pPr>
             <a:r>
-              <a:rPr lang="fr-FR" b="1" dirty="0"/>
-              <a:t>Exceptions : </a:t>
-            </a:r>
-            <a:endParaRPr lang="fr-FR" dirty="0"/>
-          </a:p>
-          <a:p>
-            <a:pPr lvl="1">
+              <a:rPr lang="fr-FR" sz="1600" dirty="0"/>
+              <a:t>L'adhérent ne choisit pas de photo de profil</a:t>
+            </a:r>
+          </a:p>
+          <a:p>
+            <a:pPr marL="274320" lvl="1" indent="0">
               <a:spcBef>
                 <a:spcPts val="0"/>
               </a:spcBef>
+              <a:buNone/>
             </a:pPr>
             <a:r>
-              <a:rPr lang="fr-FR" dirty="0"/>
-              <a:t>Si le système n'arrive temporairement pas à joindre la base de données, il affiche un message d'erreur du type : "connexion à la base de données impossible, veuillez réessayer plus tard</a:t>
-            </a:r>
-            <a:r>
-              <a:rPr lang="fr-FR" dirty="0" smtClean="0"/>
-              <a:t>".</a:t>
-            </a:r>
-            <a:endParaRPr lang="fr-FR" dirty="0"/>
-          </a:p>
-          <a:p>
-            <a:pPr>
+              <a:rPr lang="fr-FR" sz="1600" dirty="0"/>
+              <a:t>Le  système laisse un avatar par </a:t>
+            </a:r>
+            <a:r>
+              <a:rPr lang="fr-FR" sz="1600" dirty="0" smtClean="0"/>
+              <a:t>défaut</a:t>
+            </a:r>
+          </a:p>
+          <a:p>
+            <a:pPr marL="274320" lvl="1" indent="0">
               <a:spcBef>
                 <a:spcPts val="0"/>
               </a:spcBef>
+              <a:buNone/>
             </a:pPr>
-            <a:r>
-              <a:rPr lang="fr-FR" b="1" dirty="0" err="1"/>
-              <a:t>Postconditions</a:t>
-            </a:r>
-            <a:r>
-              <a:rPr lang="fr-FR" b="1" dirty="0"/>
-              <a:t> : </a:t>
-            </a:r>
-            <a:endParaRPr lang="fr-FR" dirty="0"/>
-          </a:p>
-          <a:p>
-            <a:pPr lvl="1">
+            <a:endParaRPr lang="fr-FR" sz="1600" dirty="0"/>
+          </a:p>
+          <a:p>
+            <a:pPr marL="0" indent="0">
               <a:spcBef>
                 <a:spcPts val="0"/>
               </a:spcBef>
+              <a:buNone/>
             </a:pPr>
             <a:r>
-              <a:rPr lang="fr-FR" dirty="0"/>
-              <a:t>L'adhérent a correctement inséré sa photo</a:t>
-            </a:r>
-          </a:p>
-          <a:p>
-            <a:pPr lvl="1">
+              <a:rPr lang="fr-FR" sz="1600" b="1" dirty="0"/>
+              <a:t>Exceptions : </a:t>
+            </a:r>
+            <a:endParaRPr lang="fr-FR" sz="1600" dirty="0"/>
+          </a:p>
+          <a:p>
+            <a:pPr marL="274320" lvl="1" indent="0">
               <a:spcBef>
                 <a:spcPts val="0"/>
               </a:spcBef>
+              <a:buNone/>
             </a:pPr>
             <a:r>
-              <a:rPr lang="fr-FR" dirty="0"/>
+              <a:rPr lang="fr-FR" sz="1600" dirty="0"/>
+              <a:t>Si le système n'arrive temporairement pas à joindre la base de données, il affiche un message d'erreur du type : "connexion à la base de données impossible, veuillez réessayer plus tard</a:t>
+            </a:r>
+            <a:r>
+              <a:rPr lang="fr-FR" sz="1600" dirty="0" smtClean="0"/>
+              <a:t>".</a:t>
+            </a:r>
+          </a:p>
+          <a:p>
+            <a:pPr marL="274320" lvl="1" indent="0">
+              <a:spcBef>
+                <a:spcPts val="0"/>
+              </a:spcBef>
+              <a:buNone/>
+            </a:pPr>
+            <a:endParaRPr lang="fr-FR" sz="1600" dirty="0"/>
+          </a:p>
+          <a:p>
+            <a:pPr marL="0" indent="0">
+              <a:spcBef>
+                <a:spcPts val="0"/>
+              </a:spcBef>
+              <a:buNone/>
+            </a:pPr>
+            <a:r>
+              <a:rPr lang="fr-FR" sz="1600" b="1" dirty="0" err="1"/>
+              <a:t>Postconditions</a:t>
+            </a:r>
+            <a:r>
+              <a:rPr lang="fr-FR" sz="1600" b="1" dirty="0"/>
+              <a:t> : </a:t>
+            </a:r>
+            <a:endParaRPr lang="fr-FR" sz="1600" dirty="0"/>
+          </a:p>
+          <a:p>
+            <a:pPr marL="274320" lvl="1" indent="0">
+              <a:spcBef>
+                <a:spcPts val="0"/>
+              </a:spcBef>
+              <a:buNone/>
+            </a:pPr>
+            <a:r>
+              <a:rPr lang="fr-FR" sz="1600" dirty="0"/>
+              <a:t>L'adhérent a correctement inséré sa photo</a:t>
+            </a:r>
+          </a:p>
+          <a:p>
+            <a:pPr marL="274320" lvl="1" indent="0">
+              <a:spcBef>
+                <a:spcPts val="0"/>
+              </a:spcBef>
+              <a:buNone/>
+            </a:pPr>
+            <a:r>
+              <a:rPr lang="fr-FR" sz="1600" dirty="0"/>
               <a:t>Le système affiche sa page de profil, comprenant sa photo correctement affichée.</a:t>
             </a:r>
           </a:p>
@@ -15293,6 +15478,39 @@
               <a:t>9</a:t>
             </a:fld>
             <a:endParaRPr lang="en-US" dirty="0"/>
+          </a:p>
+        </p:txBody>
+      </p:sp>
+      <p:sp>
+        <p:nvSpPr>
+          <p:cNvPr id="7" name="ZoneTexte 6"/>
+          <p:cNvSpPr txBox="1"/>
+          <p:nvPr/>
+        </p:nvSpPr>
+        <p:spPr>
+          <a:xfrm>
+            <a:off x="6769320" y="508091"/>
+            <a:ext cx="4377216" cy="646331"/>
+          </a:xfrm>
+          <a:prstGeom prst="rect">
+            <a:avLst/>
+          </a:prstGeom>
+          <a:noFill/>
+        </p:spPr>
+        <p:txBody>
+          <a:bodyPr wrap="square" rtlCol="0">
+            <a:spAutoFit/>
+          </a:bodyPr>
+          <a:lstStyle/>
+          <a:p>
+            <a:r>
+              <a:rPr lang="fr-FR" u="sng" dirty="0"/>
+              <a:t>Cas : "Ajouter sa photo de profil"</a:t>
+            </a:r>
+            <a:endParaRPr lang="fr-FR" dirty="0"/>
+          </a:p>
+          <a:p>
+            <a:endParaRPr lang="fr-FR" dirty="0"/>
           </a:p>
         </p:txBody>
       </p:sp>
@@ -15306,6 +15524,13 @@
   <p:clrMapOvr>
     <a:masterClrMapping/>
   </p:clrMapOvr>
+  <p:timing>
+    <p:tnLst>
+      <p:par>
+        <p:cTn id="1" dur="indefinite" restart="never" nodeType="tmRoot"/>
+      </p:par>
+    </p:tnLst>
+  </p:timing>
 </p:sld>
 </file>
 

</xml_diff>